<commit_message>
finished lazy evaluation, beginning addons and nodes
</commit_message>
<xml_diff>
--- a/fig/lazy_2.pptx
+++ b/fig/lazy_2.pptx
@@ -53,7 +53,7 @@
       </p:grpSpPr>
       <p:sp>
         <p:nvSpPr>
-          <p:cNvPr id="26" name="PlaceHolder 1"/>
+          <p:cNvPr id="23" name="PlaceHolder 1"/>
           <p:cNvSpPr>
             <a:spLocks noGrp="1"/>
           </p:cNvSpPr>
@@ -64,7 +64,7 @@
         <p:spPr>
           <a:xfrm>
             <a:off x="504000" y="301320"/>
-            <a:ext cx="9071640" cy="1262520"/>
+            <a:ext cx="9071280" cy="1262520"/>
           </a:xfrm>
           <a:prstGeom prst="rect">
             <a:avLst/>
@@ -80,7 +80,7 @@
       </p:sp>
       <p:sp>
         <p:nvSpPr>
-          <p:cNvPr id="27" name="PlaceHolder 2"/>
+          <p:cNvPr id="24" name="PlaceHolder 2"/>
           <p:cNvSpPr>
             <a:spLocks noGrp="1"/>
           </p:cNvSpPr>
@@ -90,8 +90,8 @@
         </p:nvSpPr>
         <p:spPr>
           <a:xfrm>
-            <a:off x="504000" y="1769040"/>
-            <a:ext cx="9071640" cy="2091240"/>
+            <a:off x="504000" y="1768680"/>
+            <a:ext cx="9072000" cy="2090880"/>
           </a:xfrm>
           <a:prstGeom prst="rect">
             <a:avLst/>
@@ -106,7 +106,7 @@
       </p:sp>
       <p:sp>
         <p:nvSpPr>
-          <p:cNvPr id="28" name="PlaceHolder 3"/>
+          <p:cNvPr id="25" name="PlaceHolder 3"/>
           <p:cNvSpPr>
             <a:spLocks noGrp="1"/>
           </p:cNvSpPr>
@@ -116,8 +116,8 @@
         </p:nvSpPr>
         <p:spPr>
           <a:xfrm>
-            <a:off x="504000" y="4059360"/>
-            <a:ext cx="9071640" cy="2091240"/>
+            <a:off x="504000" y="4058640"/>
+            <a:ext cx="9072000" cy="2090880"/>
           </a:xfrm>
           <a:prstGeom prst="rect">
             <a:avLst/>
@@ -154,7 +154,7 @@
       </p:grpSpPr>
       <p:sp>
         <p:nvSpPr>
-          <p:cNvPr id="29" name="PlaceHolder 1"/>
+          <p:cNvPr id="26" name="PlaceHolder 1"/>
           <p:cNvSpPr>
             <a:spLocks noGrp="1"/>
           </p:cNvSpPr>
@@ -165,7 +165,7 @@
         <p:spPr>
           <a:xfrm>
             <a:off x="504000" y="301320"/>
-            <a:ext cx="9071640" cy="1262520"/>
+            <a:ext cx="9071280" cy="1262520"/>
           </a:xfrm>
           <a:prstGeom prst="rect">
             <a:avLst/>
@@ -181,7 +181,7 @@
       </p:sp>
       <p:sp>
         <p:nvSpPr>
-          <p:cNvPr id="30" name="PlaceHolder 2"/>
+          <p:cNvPr id="27" name="PlaceHolder 2"/>
           <p:cNvSpPr>
             <a:spLocks noGrp="1"/>
           </p:cNvSpPr>
@@ -191,8 +191,8 @@
         </p:nvSpPr>
         <p:spPr>
           <a:xfrm>
-            <a:off x="504000" y="1769040"/>
-            <a:ext cx="4426920" cy="2091240"/>
+            <a:off x="504000" y="1768680"/>
+            <a:ext cx="4426920" cy="2090880"/>
           </a:xfrm>
           <a:prstGeom prst="rect">
             <a:avLst/>
@@ -207,7 +207,7 @@
       </p:sp>
       <p:sp>
         <p:nvSpPr>
-          <p:cNvPr id="31" name="PlaceHolder 3"/>
+          <p:cNvPr id="28" name="PlaceHolder 3"/>
           <p:cNvSpPr>
             <a:spLocks noGrp="1"/>
           </p:cNvSpPr>
@@ -217,8 +217,8 @@
         </p:nvSpPr>
         <p:spPr>
           <a:xfrm>
-            <a:off x="5152680" y="1769040"/>
-            <a:ext cx="4426920" cy="2091240"/>
+            <a:off x="5152680" y="1768680"/>
+            <a:ext cx="4426920" cy="2090880"/>
           </a:xfrm>
           <a:prstGeom prst="rect">
             <a:avLst/>
@@ -233,7 +233,7 @@
       </p:sp>
       <p:sp>
         <p:nvSpPr>
-          <p:cNvPr id="32" name="PlaceHolder 4"/>
+          <p:cNvPr id="29" name="PlaceHolder 4"/>
           <p:cNvSpPr>
             <a:spLocks noGrp="1"/>
           </p:cNvSpPr>
@@ -243,8 +243,8 @@
         </p:nvSpPr>
         <p:spPr>
           <a:xfrm>
-            <a:off x="5152680" y="4059360"/>
-            <a:ext cx="4426920" cy="2091240"/>
+            <a:off x="5152680" y="4058640"/>
+            <a:ext cx="4426920" cy="2090880"/>
           </a:xfrm>
           <a:prstGeom prst="rect">
             <a:avLst/>
@@ -259,7 +259,7 @@
       </p:sp>
       <p:sp>
         <p:nvSpPr>
-          <p:cNvPr id="33" name="PlaceHolder 5"/>
+          <p:cNvPr id="30" name="PlaceHolder 5"/>
           <p:cNvSpPr>
             <a:spLocks noGrp="1"/>
           </p:cNvSpPr>
@@ -269,8 +269,8 @@
         </p:nvSpPr>
         <p:spPr>
           <a:xfrm>
-            <a:off x="504000" y="4059360"/>
-            <a:ext cx="4426920" cy="2091240"/>
+            <a:off x="504000" y="4058640"/>
+            <a:ext cx="4426920" cy="2090880"/>
           </a:xfrm>
           <a:prstGeom prst="rect">
             <a:avLst/>
@@ -307,7 +307,7 @@
       </p:grpSpPr>
       <p:sp>
         <p:nvSpPr>
-          <p:cNvPr id="34" name="PlaceHolder 1"/>
+          <p:cNvPr id="31" name="PlaceHolder 1"/>
           <p:cNvSpPr>
             <a:spLocks noGrp="1"/>
           </p:cNvSpPr>
@@ -318,7 +318,7 @@
         <p:spPr>
           <a:xfrm>
             <a:off x="504000" y="301320"/>
-            <a:ext cx="9071640" cy="1262520"/>
+            <a:ext cx="9071280" cy="1262520"/>
           </a:xfrm>
           <a:prstGeom prst="rect">
             <a:avLst/>
@@ -334,7 +334,7 @@
       </p:sp>
       <p:sp>
         <p:nvSpPr>
-          <p:cNvPr id="35" name="PlaceHolder 2"/>
+          <p:cNvPr id="32" name="PlaceHolder 2"/>
           <p:cNvSpPr>
             <a:spLocks noGrp="1"/>
           </p:cNvSpPr>
@@ -344,8 +344,8 @@
         </p:nvSpPr>
         <p:spPr>
           <a:xfrm>
-            <a:off x="504000" y="1769040"/>
-            <a:ext cx="9071640" cy="4384440"/>
+            <a:off x="504000" y="1768680"/>
+            <a:ext cx="9072000" cy="4384080"/>
           </a:xfrm>
           <a:prstGeom prst="rect">
             <a:avLst/>
@@ -360,7 +360,7 @@
       </p:sp>
       <p:sp>
         <p:nvSpPr>
-          <p:cNvPr id="36" name="PlaceHolder 3"/>
+          <p:cNvPr id="33" name="PlaceHolder 3"/>
           <p:cNvSpPr>
             <a:spLocks noGrp="1"/>
           </p:cNvSpPr>
@@ -370,8 +370,8 @@
         </p:nvSpPr>
         <p:spPr>
           <a:xfrm>
-            <a:off x="504000" y="1769040"/>
-            <a:ext cx="9071640" cy="4384440"/>
+            <a:off x="504000" y="1768680"/>
+            <a:ext cx="9072000" cy="4384080"/>
           </a:xfrm>
           <a:prstGeom prst="rect">
             <a:avLst/>
@@ -386,7 +386,7 @@
       </p:sp>
       <p:pic>
         <p:nvPicPr>
-          <p:cNvPr id="37" name="" descr=""/>
+          <p:cNvPr id="34" name="" descr=""/>
           <p:cNvPicPr/>
           <p:nvPr/>
         </p:nvPicPr>
@@ -398,8 +398,8 @@
         </p:blipFill>
         <p:spPr>
           <a:xfrm>
-            <a:off x="2292120" y="1768680"/>
-            <a:ext cx="5495040" cy="4384440"/>
+            <a:off x="2292480" y="1768680"/>
+            <a:ext cx="5494680" cy="4384080"/>
           </a:xfrm>
           <a:prstGeom prst="rect">
             <a:avLst/>
@@ -411,7 +411,7 @@
       </p:pic>
       <p:pic>
         <p:nvPicPr>
-          <p:cNvPr id="38" name="" descr=""/>
+          <p:cNvPr id="35" name="" descr=""/>
           <p:cNvPicPr/>
           <p:nvPr/>
         </p:nvPicPr>
@@ -423,8 +423,8 @@
         </p:blipFill>
         <p:spPr>
           <a:xfrm>
-            <a:off x="2292120" y="1768680"/>
-            <a:ext cx="5495040" cy="4384440"/>
+            <a:off x="2292480" y="1768680"/>
+            <a:ext cx="5494680" cy="4384080"/>
           </a:xfrm>
           <a:prstGeom prst="rect">
             <a:avLst/>
@@ -458,7 +458,7 @@
       </p:grpSpPr>
       <p:sp>
         <p:nvSpPr>
-          <p:cNvPr id="5" name="PlaceHolder 1"/>
+          <p:cNvPr id="2" name="PlaceHolder 1"/>
           <p:cNvSpPr>
             <a:spLocks noGrp="1"/>
           </p:cNvSpPr>
@@ -469,7 +469,7 @@
         <p:spPr>
           <a:xfrm>
             <a:off x="504000" y="301320"/>
-            <a:ext cx="9071640" cy="1262520"/>
+            <a:ext cx="9071280" cy="1262520"/>
           </a:xfrm>
           <a:prstGeom prst="rect">
             <a:avLst/>
@@ -485,7 +485,7 @@
       </p:sp>
       <p:sp>
         <p:nvSpPr>
-          <p:cNvPr id="6" name="PlaceHolder 2"/>
+          <p:cNvPr id="3" name="PlaceHolder 2"/>
           <p:cNvSpPr>
             <a:spLocks noGrp="1"/>
           </p:cNvSpPr>
@@ -495,8 +495,8 @@
         </p:nvSpPr>
         <p:spPr>
           <a:xfrm>
-            <a:off x="504000" y="1769040"/>
-            <a:ext cx="9071640" cy="4384800"/>
+            <a:off x="504000" y="1768680"/>
+            <a:ext cx="9072000" cy="4384440"/>
           </a:xfrm>
           <a:prstGeom prst="rect">
             <a:avLst/>
@@ -534,7 +534,7 @@
       </p:grpSpPr>
       <p:sp>
         <p:nvSpPr>
-          <p:cNvPr id="7" name="PlaceHolder 1"/>
+          <p:cNvPr id="4" name="PlaceHolder 1"/>
           <p:cNvSpPr>
             <a:spLocks noGrp="1"/>
           </p:cNvSpPr>
@@ -545,7 +545,7 @@
         <p:spPr>
           <a:xfrm>
             <a:off x="504000" y="301320"/>
-            <a:ext cx="9071640" cy="1262520"/>
+            <a:ext cx="9071280" cy="1262520"/>
           </a:xfrm>
           <a:prstGeom prst="rect">
             <a:avLst/>
@@ -561,7 +561,7 @@
       </p:sp>
       <p:sp>
         <p:nvSpPr>
-          <p:cNvPr id="8" name="PlaceHolder 2"/>
+          <p:cNvPr id="5" name="PlaceHolder 2"/>
           <p:cNvSpPr>
             <a:spLocks noGrp="1"/>
           </p:cNvSpPr>
@@ -571,8 +571,8 @@
         </p:nvSpPr>
         <p:spPr>
           <a:xfrm>
-            <a:off x="504000" y="1769040"/>
-            <a:ext cx="9071640" cy="4384440"/>
+            <a:off x="504000" y="1768680"/>
+            <a:ext cx="9072000" cy="4384080"/>
           </a:xfrm>
           <a:prstGeom prst="rect">
             <a:avLst/>
@@ -609,7 +609,7 @@
       </p:grpSpPr>
       <p:sp>
         <p:nvSpPr>
-          <p:cNvPr id="9" name="PlaceHolder 1"/>
+          <p:cNvPr id="6" name="PlaceHolder 1"/>
           <p:cNvSpPr>
             <a:spLocks noGrp="1"/>
           </p:cNvSpPr>
@@ -620,7 +620,7 @@
         <p:spPr>
           <a:xfrm>
             <a:off x="504000" y="301320"/>
-            <a:ext cx="9071640" cy="1262520"/>
+            <a:ext cx="9071280" cy="1262520"/>
           </a:xfrm>
           <a:prstGeom prst="rect">
             <a:avLst/>
@@ -636,7 +636,7 @@
       </p:sp>
       <p:sp>
         <p:nvSpPr>
-          <p:cNvPr id="10" name="PlaceHolder 2"/>
+          <p:cNvPr id="7" name="PlaceHolder 2"/>
           <p:cNvSpPr>
             <a:spLocks noGrp="1"/>
           </p:cNvSpPr>
@@ -646,8 +646,8 @@
         </p:nvSpPr>
         <p:spPr>
           <a:xfrm>
-            <a:off x="504000" y="1769040"/>
-            <a:ext cx="4426920" cy="4384440"/>
+            <a:off x="504000" y="1768680"/>
+            <a:ext cx="4426920" cy="4384080"/>
           </a:xfrm>
           <a:prstGeom prst="rect">
             <a:avLst/>
@@ -662,7 +662,7 @@
       </p:sp>
       <p:sp>
         <p:nvSpPr>
-          <p:cNvPr id="11" name="PlaceHolder 3"/>
+          <p:cNvPr id="8" name="PlaceHolder 3"/>
           <p:cNvSpPr>
             <a:spLocks noGrp="1"/>
           </p:cNvSpPr>
@@ -672,8 +672,8 @@
         </p:nvSpPr>
         <p:spPr>
           <a:xfrm>
-            <a:off x="5152680" y="1769040"/>
-            <a:ext cx="4426920" cy="4384440"/>
+            <a:off x="5152680" y="1768680"/>
+            <a:ext cx="4426920" cy="4384080"/>
           </a:xfrm>
           <a:prstGeom prst="rect">
             <a:avLst/>
@@ -710,7 +710,7 @@
       </p:grpSpPr>
       <p:sp>
         <p:nvSpPr>
-          <p:cNvPr id="12" name="PlaceHolder 1"/>
+          <p:cNvPr id="9" name="PlaceHolder 1"/>
           <p:cNvSpPr>
             <a:spLocks noGrp="1"/>
           </p:cNvSpPr>
@@ -721,7 +721,7 @@
         <p:spPr>
           <a:xfrm>
             <a:off x="504000" y="301320"/>
-            <a:ext cx="9071640" cy="1262520"/>
+            <a:ext cx="9071280" cy="1262520"/>
           </a:xfrm>
           <a:prstGeom prst="rect">
             <a:avLst/>
@@ -759,7 +759,7 @@
       </p:grpSpPr>
       <p:sp>
         <p:nvSpPr>
-          <p:cNvPr id="13" name="PlaceHolder 1"/>
+          <p:cNvPr id="10" name="PlaceHolder 1"/>
           <p:cNvSpPr>
             <a:spLocks noGrp="1"/>
           </p:cNvSpPr>
@@ -770,7 +770,7 @@
         <p:spPr>
           <a:xfrm>
             <a:off x="504000" y="301320"/>
-            <a:ext cx="9071640" cy="5852160"/>
+            <a:ext cx="9071280" cy="5852160"/>
           </a:xfrm>
           <a:prstGeom prst="rect">
             <a:avLst/>
@@ -808,7 +808,7 @@
       </p:grpSpPr>
       <p:sp>
         <p:nvSpPr>
-          <p:cNvPr id="14" name="PlaceHolder 1"/>
+          <p:cNvPr id="11" name="PlaceHolder 1"/>
           <p:cNvSpPr>
             <a:spLocks noGrp="1"/>
           </p:cNvSpPr>
@@ -819,7 +819,7 @@
         <p:spPr>
           <a:xfrm>
             <a:off x="504000" y="301320"/>
-            <a:ext cx="9071640" cy="1262520"/>
+            <a:ext cx="9071280" cy="1262520"/>
           </a:xfrm>
           <a:prstGeom prst="rect">
             <a:avLst/>
@@ -835,7 +835,7 @@
       </p:sp>
       <p:sp>
         <p:nvSpPr>
-          <p:cNvPr id="15" name="PlaceHolder 2"/>
+          <p:cNvPr id="12" name="PlaceHolder 2"/>
           <p:cNvSpPr>
             <a:spLocks noGrp="1"/>
           </p:cNvSpPr>
@@ -845,8 +845,8 @@
         </p:nvSpPr>
         <p:spPr>
           <a:xfrm>
-            <a:off x="504000" y="1769040"/>
-            <a:ext cx="4426920" cy="2091240"/>
+            <a:off x="504000" y="1768680"/>
+            <a:ext cx="4426920" cy="2090880"/>
           </a:xfrm>
           <a:prstGeom prst="rect">
             <a:avLst/>
@@ -861,7 +861,7 @@
       </p:sp>
       <p:sp>
         <p:nvSpPr>
-          <p:cNvPr id="16" name="PlaceHolder 3"/>
+          <p:cNvPr id="13" name="PlaceHolder 3"/>
           <p:cNvSpPr>
             <a:spLocks noGrp="1"/>
           </p:cNvSpPr>
@@ -871,8 +871,8 @@
         </p:nvSpPr>
         <p:spPr>
           <a:xfrm>
-            <a:off x="504000" y="4059360"/>
-            <a:ext cx="4426920" cy="2091240"/>
+            <a:off x="504000" y="4058640"/>
+            <a:ext cx="4426920" cy="2090880"/>
           </a:xfrm>
           <a:prstGeom prst="rect">
             <a:avLst/>
@@ -887,7 +887,7 @@
       </p:sp>
       <p:sp>
         <p:nvSpPr>
-          <p:cNvPr id="17" name="PlaceHolder 4"/>
+          <p:cNvPr id="14" name="PlaceHolder 4"/>
           <p:cNvSpPr>
             <a:spLocks noGrp="1"/>
           </p:cNvSpPr>
@@ -897,8 +897,8 @@
         </p:nvSpPr>
         <p:spPr>
           <a:xfrm>
-            <a:off x="5152680" y="1769040"/>
-            <a:ext cx="4426920" cy="4384440"/>
+            <a:off x="5152680" y="1768680"/>
+            <a:ext cx="4426920" cy="4384080"/>
           </a:xfrm>
           <a:prstGeom prst="rect">
             <a:avLst/>
@@ -935,7 +935,7 @@
       </p:grpSpPr>
       <p:sp>
         <p:nvSpPr>
-          <p:cNvPr id="18" name="PlaceHolder 1"/>
+          <p:cNvPr id="15" name="PlaceHolder 1"/>
           <p:cNvSpPr>
             <a:spLocks noGrp="1"/>
           </p:cNvSpPr>
@@ -946,7 +946,7 @@
         <p:spPr>
           <a:xfrm>
             <a:off x="504000" y="301320"/>
-            <a:ext cx="9071640" cy="1262520"/>
+            <a:ext cx="9071280" cy="1262520"/>
           </a:xfrm>
           <a:prstGeom prst="rect">
             <a:avLst/>
@@ -962,7 +962,7 @@
       </p:sp>
       <p:sp>
         <p:nvSpPr>
-          <p:cNvPr id="19" name="PlaceHolder 2"/>
+          <p:cNvPr id="16" name="PlaceHolder 2"/>
           <p:cNvSpPr>
             <a:spLocks noGrp="1"/>
           </p:cNvSpPr>
@@ -972,8 +972,8 @@
         </p:nvSpPr>
         <p:spPr>
           <a:xfrm>
-            <a:off x="504000" y="1769040"/>
-            <a:ext cx="4426920" cy="4384440"/>
+            <a:off x="504000" y="1768680"/>
+            <a:ext cx="4426920" cy="4384080"/>
           </a:xfrm>
           <a:prstGeom prst="rect">
             <a:avLst/>
@@ -988,7 +988,7 @@
       </p:sp>
       <p:sp>
         <p:nvSpPr>
-          <p:cNvPr id="20" name="PlaceHolder 3"/>
+          <p:cNvPr id="17" name="PlaceHolder 3"/>
           <p:cNvSpPr>
             <a:spLocks noGrp="1"/>
           </p:cNvSpPr>
@@ -998,8 +998,8 @@
         </p:nvSpPr>
         <p:spPr>
           <a:xfrm>
-            <a:off x="5152680" y="1769040"/>
-            <a:ext cx="4426920" cy="2091240"/>
+            <a:off x="5152680" y="1768680"/>
+            <a:ext cx="4426920" cy="2090880"/>
           </a:xfrm>
           <a:prstGeom prst="rect">
             <a:avLst/>
@@ -1014,7 +1014,7 @@
       </p:sp>
       <p:sp>
         <p:nvSpPr>
-          <p:cNvPr id="21" name="PlaceHolder 4"/>
+          <p:cNvPr id="18" name="PlaceHolder 4"/>
           <p:cNvSpPr>
             <a:spLocks noGrp="1"/>
           </p:cNvSpPr>
@@ -1024,8 +1024,8 @@
         </p:nvSpPr>
         <p:spPr>
           <a:xfrm>
-            <a:off x="5152680" y="4059360"/>
-            <a:ext cx="4426920" cy="2091240"/>
+            <a:off x="5152680" y="4058640"/>
+            <a:ext cx="4426920" cy="2090880"/>
           </a:xfrm>
           <a:prstGeom prst="rect">
             <a:avLst/>
@@ -1062,7 +1062,7 @@
       </p:grpSpPr>
       <p:sp>
         <p:nvSpPr>
-          <p:cNvPr id="22" name="PlaceHolder 1"/>
+          <p:cNvPr id="19" name="PlaceHolder 1"/>
           <p:cNvSpPr>
             <a:spLocks noGrp="1"/>
           </p:cNvSpPr>
@@ -1073,7 +1073,7 @@
         <p:spPr>
           <a:xfrm>
             <a:off x="504000" y="301320"/>
-            <a:ext cx="9071640" cy="1262520"/>
+            <a:ext cx="9071280" cy="1262520"/>
           </a:xfrm>
           <a:prstGeom prst="rect">
             <a:avLst/>
@@ -1089,7 +1089,7 @@
       </p:sp>
       <p:sp>
         <p:nvSpPr>
-          <p:cNvPr id="23" name="PlaceHolder 2"/>
+          <p:cNvPr id="20" name="PlaceHolder 2"/>
           <p:cNvSpPr>
             <a:spLocks noGrp="1"/>
           </p:cNvSpPr>
@@ -1099,8 +1099,8 @@
         </p:nvSpPr>
         <p:spPr>
           <a:xfrm>
-            <a:off x="504000" y="1769040"/>
-            <a:ext cx="4426920" cy="2091240"/>
+            <a:off x="504000" y="1768680"/>
+            <a:ext cx="4426920" cy="2090880"/>
           </a:xfrm>
           <a:prstGeom prst="rect">
             <a:avLst/>
@@ -1115,7 +1115,7 @@
       </p:sp>
       <p:sp>
         <p:nvSpPr>
-          <p:cNvPr id="24" name="PlaceHolder 3"/>
+          <p:cNvPr id="21" name="PlaceHolder 3"/>
           <p:cNvSpPr>
             <a:spLocks noGrp="1"/>
           </p:cNvSpPr>
@@ -1125,8 +1125,8 @@
         </p:nvSpPr>
         <p:spPr>
           <a:xfrm>
-            <a:off x="5152680" y="1769040"/>
-            <a:ext cx="4426920" cy="2091240"/>
+            <a:off x="5152680" y="1768680"/>
+            <a:ext cx="4426920" cy="2090880"/>
           </a:xfrm>
           <a:prstGeom prst="rect">
             <a:avLst/>
@@ -1141,7 +1141,7 @@
       </p:sp>
       <p:sp>
         <p:nvSpPr>
-          <p:cNvPr id="25" name="PlaceHolder 4"/>
+          <p:cNvPr id="22" name="PlaceHolder 4"/>
           <p:cNvSpPr>
             <a:spLocks noGrp="1"/>
           </p:cNvSpPr>
@@ -1151,8 +1151,8 @@
         </p:nvSpPr>
         <p:spPr>
           <a:xfrm>
-            <a:off x="504000" y="4059360"/>
-            <a:ext cx="9071640" cy="2091240"/>
+            <a:off x="504000" y="4058640"/>
+            <a:ext cx="9072000" cy="2090880"/>
           </a:xfrm>
           <a:prstGeom prst="rect">
             <a:avLst/>
@@ -1200,7 +1200,7 @@
         <p:spPr>
           <a:xfrm>
             <a:off x="504000" y="301320"/>
-            <a:ext cx="9071640" cy="1262160"/>
+            <a:ext cx="9071280" cy="1262160"/>
           </a:xfrm>
           <a:prstGeom prst="rect">
             <a:avLst/>
@@ -1209,9 +1209,8 @@
         <p:txBody>
           <a:bodyPr lIns="0" rIns="0" tIns="0" bIns="0" anchor="ctr"/>
           <a:p>
-            <a:pPr algn="ctr"/>
             <a:r>
-              <a:rPr lang="en-US" sz="4400">
+              <a:rPr lang="en-US">
                 <a:latin typeface="Arial"/>
               </a:rPr>
               <a:t>Click to edit the title text format</a:t>
@@ -1232,8 +1231,8 @@
         </p:nvSpPr>
         <p:spPr>
           <a:xfrm>
-            <a:off x="504000" y="1769040"/>
-            <a:ext cx="9071640" cy="4384440"/>
+            <a:off x="504000" y="1768680"/>
+            <a:ext cx="9072000" cy="4384080"/>
           </a:xfrm>
           <a:prstGeom prst="rect">
             <a:avLst/>
@@ -1337,104 +1336,6 @@
               </a:rPr>
               <a:t>Seventh Outline Level</a:t>
             </a:r>
-            <a:endParaRPr/>
-          </a:p>
-        </p:txBody>
-      </p:sp>
-      <p:sp>
-        <p:nvSpPr>
-          <p:cNvPr id="2" name="PlaceHolder 3"/>
-          <p:cNvSpPr>
-            <a:spLocks noGrp="1"/>
-          </p:cNvSpPr>
-          <p:nvPr>
-            <p:ph type="dt"/>
-          </p:nvPr>
-        </p:nvSpPr>
-        <p:spPr>
-          <a:xfrm>
-            <a:off x="504000" y="6887160"/>
-            <a:ext cx="2348280" cy="521280"/>
-          </a:xfrm>
-          <a:prstGeom prst="rect">
-            <a:avLst/>
-          </a:prstGeom>
-        </p:spPr>
-        <p:txBody>
-          <a:bodyPr lIns="0" rIns="0" tIns="0" bIns="0"/>
-          <a:p>
-            <a:r>
-              <a:rPr lang="en-US" sz="1400">
-                <a:latin typeface="Times New Roman"/>
-              </a:rPr>
-              <a:t>&lt;date/time&gt;</a:t>
-            </a:r>
-            <a:endParaRPr/>
-          </a:p>
-        </p:txBody>
-      </p:sp>
-      <p:sp>
-        <p:nvSpPr>
-          <p:cNvPr id="3" name="PlaceHolder 4"/>
-          <p:cNvSpPr>
-            <a:spLocks noGrp="1"/>
-          </p:cNvSpPr>
-          <p:nvPr>
-            <p:ph type="ftr"/>
-          </p:nvPr>
-        </p:nvSpPr>
-        <p:spPr>
-          <a:xfrm>
-            <a:off x="3447360" y="6887160"/>
-            <a:ext cx="3195000" cy="521280"/>
-          </a:xfrm>
-          <a:prstGeom prst="rect">
-            <a:avLst/>
-          </a:prstGeom>
-        </p:spPr>
-        <p:txBody>
-          <a:bodyPr lIns="0" rIns="0" tIns="0" bIns="0"/>
-          <a:p>
-            <a:pPr algn="ctr"/>
-            <a:r>
-              <a:rPr lang="en-US" sz="1400">
-                <a:latin typeface="Times New Roman"/>
-              </a:rPr>
-              <a:t>&lt;footer&gt;</a:t>
-            </a:r>
-            <a:endParaRPr/>
-          </a:p>
-        </p:txBody>
-      </p:sp>
-      <p:sp>
-        <p:nvSpPr>
-          <p:cNvPr id="4" name="PlaceHolder 5"/>
-          <p:cNvSpPr>
-            <a:spLocks noGrp="1"/>
-          </p:cNvSpPr>
-          <p:nvPr>
-            <p:ph type="sldNum"/>
-          </p:nvPr>
-        </p:nvSpPr>
-        <p:spPr>
-          <a:xfrm>
-            <a:off x="7227360" y="6887160"/>
-            <a:ext cx="2348280" cy="521280"/>
-          </a:xfrm>
-          <a:prstGeom prst="rect">
-            <a:avLst/>
-          </a:prstGeom>
-        </p:spPr>
-        <p:txBody>
-          <a:bodyPr lIns="0" rIns="0" tIns="0" bIns="0"/>
-          <a:p>
-            <a:pPr algn="r"/>
-            <a:fld id="{494E14DD-57D2-447B-ABCE-CE1E3C95901A}" type="slidenum">
-              <a:rPr lang="en-US" sz="1400">
-                <a:latin typeface="Times New Roman"/>
-              </a:rPr>
-              <a:t>&lt;number&gt;</a:t>
-            </a:fld>
             <a:endParaRPr/>
           </a:p>
         </p:txBody>
@@ -1478,14 +1379,14 @@
       </p:grpSpPr>
       <p:sp>
         <p:nvSpPr>
-          <p:cNvPr id="39" name="Rectangle 1"/>
+          <p:cNvPr id="36" name="CustomShape 1"/>
           <p:cNvSpPr/>
           <p:nvPr/>
         </p:nvSpPr>
         <p:spPr>
           <a:xfrm>
             <a:off x="548640" y="1828800"/>
-            <a:ext cx="7955280" cy="4480560"/>
+            <a:ext cx="7954920" cy="4480200"/>
           </a:xfrm>
           <a:prstGeom prst="rect">
             <a:avLst/>
@@ -1500,7 +1401,7 @@
       </p:sp>
       <p:sp>
         <p:nvSpPr>
-          <p:cNvPr id="40" name="Line 2"/>
+          <p:cNvPr id="37" name="Line 2"/>
           <p:cNvSpPr/>
           <p:nvPr/>
         </p:nvSpPr>
@@ -1522,7 +1423,7 @@
       </p:sp>
       <p:sp>
         <p:nvSpPr>
-          <p:cNvPr id="41" name="Line 3"/>
+          <p:cNvPr id="38" name="Line 3"/>
           <p:cNvSpPr/>
           <p:nvPr/>
         </p:nvSpPr>
@@ -1544,7 +1445,7 @@
       </p:sp>
       <p:sp>
         <p:nvSpPr>
-          <p:cNvPr id="42" name="Line 4"/>
+          <p:cNvPr id="39" name="Line 4"/>
           <p:cNvSpPr/>
           <p:nvPr/>
         </p:nvSpPr>
@@ -1566,7 +1467,7 @@
       </p:sp>
       <p:sp>
         <p:nvSpPr>
-          <p:cNvPr id="43" name="Line 5"/>
+          <p:cNvPr id="40" name="Line 5"/>
           <p:cNvSpPr/>
           <p:nvPr/>
         </p:nvSpPr>
@@ -1588,7 +1489,7 @@
       </p:sp>
       <p:sp>
         <p:nvSpPr>
-          <p:cNvPr id="44" name="Line 6"/>
+          <p:cNvPr id="41" name="Line 6"/>
           <p:cNvSpPr/>
           <p:nvPr/>
         </p:nvSpPr>
@@ -1610,14 +1511,14 @@
       </p:sp>
       <p:sp>
         <p:nvSpPr>
-          <p:cNvPr id="45" name="CustomShape 7"/>
+          <p:cNvPr id="42" name="CustomShape 7"/>
           <p:cNvSpPr/>
           <p:nvPr/>
         </p:nvSpPr>
         <p:spPr>
           <a:xfrm>
             <a:off x="4314600" y="5288040"/>
-            <a:ext cx="317160" cy="441000"/>
+            <a:ext cx="316800" cy="440640"/>
           </a:xfrm>
           <a:prstGeom prst="rect">
             <a:avLst/>
@@ -1643,7 +1544,7 @@
       </p:sp>
       <p:sp>
         <p:nvSpPr>
-          <p:cNvPr id="46" name="Line 8"/>
+          <p:cNvPr id="43" name="Line 8"/>
           <p:cNvSpPr/>
           <p:nvPr/>
         </p:nvSpPr>
@@ -1665,7 +1566,7 @@
       </p:sp>
       <p:sp>
         <p:nvSpPr>
-          <p:cNvPr id="47" name="Line 9"/>
+          <p:cNvPr id="44" name="Line 9"/>
           <p:cNvSpPr/>
           <p:nvPr/>
         </p:nvSpPr>
@@ -1687,7 +1588,7 @@
       </p:sp>
       <p:sp>
         <p:nvSpPr>
-          <p:cNvPr id="48" name="Line 10"/>
+          <p:cNvPr id="45" name="Line 10"/>
           <p:cNvSpPr/>
           <p:nvPr/>
         </p:nvSpPr>
@@ -1709,7 +1610,7 @@
       </p:sp>
       <p:sp>
         <p:nvSpPr>
-          <p:cNvPr id="49" name="Line 11"/>
+          <p:cNvPr id="46" name="Line 11"/>
           <p:cNvSpPr/>
           <p:nvPr/>
         </p:nvSpPr>
@@ -1731,7 +1632,7 @@
       </p:sp>
       <p:sp>
         <p:nvSpPr>
-          <p:cNvPr id="50" name="Line 12"/>
+          <p:cNvPr id="47" name="Line 12"/>
           <p:cNvSpPr/>
           <p:nvPr/>
         </p:nvSpPr>
@@ -1753,7 +1654,7 @@
       </p:sp>
       <p:sp>
         <p:nvSpPr>
-          <p:cNvPr id="51" name="Line 13"/>
+          <p:cNvPr id="48" name="Line 13"/>
           <p:cNvSpPr/>
           <p:nvPr/>
         </p:nvSpPr>
@@ -1775,7 +1676,7 @@
       </p:sp>
       <p:sp>
         <p:nvSpPr>
-          <p:cNvPr id="52" name="Line 14"/>
+          <p:cNvPr id="49" name="Line 14"/>
           <p:cNvSpPr/>
           <p:nvPr/>
         </p:nvSpPr>
@@ -1797,7 +1698,7 @@
       </p:sp>
       <p:sp>
         <p:nvSpPr>
-          <p:cNvPr id="53" name="Line 15"/>
+          <p:cNvPr id="50" name="Line 15"/>
           <p:cNvSpPr/>
           <p:nvPr/>
         </p:nvSpPr>
@@ -1819,14 +1720,14 @@
       </p:sp>
       <p:sp>
         <p:nvSpPr>
-          <p:cNvPr id="54" name="CustomShape 16"/>
+          <p:cNvPr id="51" name="CustomShape 16"/>
           <p:cNvSpPr/>
           <p:nvPr/>
         </p:nvSpPr>
         <p:spPr>
           <a:xfrm>
             <a:off x="4492440" y="4916520"/>
-            <a:ext cx="109080" cy="109080"/>
+            <a:ext cx="108720" cy="108720"/>
           </a:xfrm>
           <a:prstGeom prst="ellipse">
             <a:avLst/>
@@ -1852,7 +1753,7 @@
       </p:sp>
       <p:sp>
         <p:nvSpPr>
-          <p:cNvPr id="55" name="Line 17"/>
+          <p:cNvPr id="52" name="Line 17"/>
           <p:cNvSpPr/>
           <p:nvPr/>
         </p:nvSpPr>
@@ -1874,14 +1775,14 @@
       </p:sp>
       <p:sp>
         <p:nvSpPr>
-          <p:cNvPr id="56" name="CustomShape 18"/>
+          <p:cNvPr id="53" name="CustomShape 18"/>
           <p:cNvSpPr/>
           <p:nvPr/>
         </p:nvSpPr>
         <p:spPr>
           <a:xfrm>
             <a:off x="4325400" y="4214520"/>
-            <a:ext cx="317160" cy="441000"/>
+            <a:ext cx="316800" cy="440640"/>
           </a:xfrm>
           <a:prstGeom prst="rect">
             <a:avLst/>
@@ -1907,7 +1808,7 @@
       </p:sp>
       <p:sp>
         <p:nvSpPr>
-          <p:cNvPr id="57" name="Line 19"/>
+          <p:cNvPr id="54" name="Line 19"/>
           <p:cNvSpPr/>
           <p:nvPr/>
         </p:nvSpPr>
@@ -1929,14 +1830,14 @@
       </p:sp>
       <p:sp>
         <p:nvSpPr>
-          <p:cNvPr id="58" name="CustomShape 20"/>
+          <p:cNvPr id="55" name="CustomShape 20"/>
           <p:cNvSpPr/>
           <p:nvPr/>
         </p:nvSpPr>
         <p:spPr>
           <a:xfrm>
             <a:off x="4416120" y="3804120"/>
-            <a:ext cx="109080" cy="109080"/>
+            <a:ext cx="108720" cy="108720"/>
           </a:xfrm>
           <a:prstGeom prst="ellipse">
             <a:avLst/>
@@ -1962,14 +1863,14 @@
       </p:sp>
       <p:sp>
         <p:nvSpPr>
-          <p:cNvPr id="59" name="CustomShape 21"/>
+          <p:cNvPr id="56" name="CustomShape 21"/>
           <p:cNvSpPr/>
           <p:nvPr/>
         </p:nvSpPr>
         <p:spPr>
           <a:xfrm rot="20239200">
-            <a:off x="4281840" y="3144240"/>
-            <a:ext cx="317160" cy="441000"/>
+            <a:off x="4281480" y="3144240"/>
+            <a:ext cx="316800" cy="440640"/>
           </a:xfrm>
           <a:prstGeom prst="rect">
             <a:avLst/>
@@ -1995,7 +1896,7 @@
       </p:sp>
       <p:sp>
         <p:nvSpPr>
-          <p:cNvPr id="60" name="Line 22"/>
+          <p:cNvPr id="57" name="Line 22"/>
           <p:cNvSpPr/>
           <p:nvPr/>
         </p:nvSpPr>
@@ -2017,7 +1918,7 @@
       </p:sp>
       <p:sp>
         <p:nvSpPr>
-          <p:cNvPr id="61" name="Line 23"/>
+          <p:cNvPr id="58" name="Line 23"/>
           <p:cNvSpPr/>
           <p:nvPr/>
         </p:nvSpPr>
@@ -2039,14 +1940,14 @@
       </p:sp>
       <p:sp>
         <p:nvSpPr>
-          <p:cNvPr id="62" name="CustomShape 24"/>
+          <p:cNvPr id="59" name="CustomShape 24"/>
           <p:cNvSpPr/>
           <p:nvPr/>
         </p:nvSpPr>
         <p:spPr>
           <a:xfrm rot="18763800">
-            <a:off x="3924720" y="3487680"/>
-            <a:ext cx="109080" cy="109080"/>
+            <a:off x="3924360" y="3487680"/>
+            <a:ext cx="108720" cy="108720"/>
           </a:xfrm>
           <a:prstGeom prst="ellipse">
             <a:avLst/>
@@ -2072,7 +1973,7 @@
       </p:sp>
       <p:sp>
         <p:nvSpPr>
-          <p:cNvPr id="63" name="Line 25"/>
+          <p:cNvPr id="60" name="Line 25"/>
           <p:cNvSpPr/>
           <p:nvPr/>
         </p:nvSpPr>
@@ -2094,14 +1995,14 @@
       </p:sp>
       <p:sp>
         <p:nvSpPr>
-          <p:cNvPr id="64" name="CustomShape 26"/>
+          <p:cNvPr id="61" name="CustomShape 26"/>
           <p:cNvSpPr/>
           <p:nvPr/>
         </p:nvSpPr>
         <p:spPr>
           <a:xfrm rot="15030000">
             <a:off x="3327840" y="3633120"/>
-            <a:ext cx="317160" cy="441000"/>
+            <a:ext cx="316800" cy="440640"/>
           </a:xfrm>
           <a:prstGeom prst="rect">
             <a:avLst/>
@@ -2127,7 +2028,7 @@
       </p:sp>
       <p:sp>
         <p:nvSpPr>
-          <p:cNvPr id="65" name="Line 27"/>
+          <p:cNvPr id="62" name="Line 27"/>
           <p:cNvSpPr/>
           <p:nvPr/>
         </p:nvSpPr>
@@ -2149,14 +2050,14 @@
       </p:sp>
       <p:sp>
         <p:nvSpPr>
-          <p:cNvPr id="66" name="CustomShape 28"/>
+          <p:cNvPr id="63" name="CustomShape 28"/>
           <p:cNvSpPr/>
           <p:nvPr/>
         </p:nvSpPr>
         <p:spPr>
           <a:xfrm rot="18763800">
-            <a:off x="2845080" y="3968640"/>
-            <a:ext cx="109080" cy="109080"/>
+            <a:off x="2844720" y="3968640"/>
+            <a:ext cx="108720" cy="108720"/>
           </a:xfrm>
           <a:prstGeom prst="ellipse">
             <a:avLst/>
@@ -2182,14 +2083,14 @@
       </p:sp>
       <p:sp>
         <p:nvSpPr>
-          <p:cNvPr id="67" name="CustomShape 29"/>
+          <p:cNvPr id="64" name="CustomShape 29"/>
           <p:cNvSpPr/>
           <p:nvPr/>
         </p:nvSpPr>
         <p:spPr>
           <a:xfrm rot="12369600">
             <a:off x="2430000" y="4268880"/>
-            <a:ext cx="317160" cy="441000"/>
+            <a:ext cx="316800" cy="440640"/>
           </a:xfrm>
           <a:prstGeom prst="rect">
             <a:avLst/>
@@ -2215,7 +2116,7 @@
       </p:sp>
       <p:sp>
         <p:nvSpPr>
-          <p:cNvPr id="68" name="Line 30"/>
+          <p:cNvPr id="65" name="Line 30"/>
           <p:cNvSpPr/>
           <p:nvPr/>
         </p:nvSpPr>
@@ -2237,7 +2138,7 @@
       </p:sp>
       <p:sp>
         <p:nvSpPr>
-          <p:cNvPr id="69" name="Line 31"/>
+          <p:cNvPr id="66" name="Line 31"/>
           <p:cNvSpPr/>
           <p:nvPr/>
         </p:nvSpPr>
@@ -2259,7 +2160,7 @@
       </p:sp>
       <p:sp>
         <p:nvSpPr>
-          <p:cNvPr id="70" name="Line 32"/>
+          <p:cNvPr id="67" name="Line 32"/>
           <p:cNvSpPr/>
           <p:nvPr/>
         </p:nvSpPr>
@@ -2281,7 +2182,7 @@
       </p:sp>
       <p:sp>
         <p:nvSpPr>
-          <p:cNvPr id="71" name="Line 33"/>
+          <p:cNvPr id="68" name="Line 33"/>
           <p:cNvSpPr/>
           <p:nvPr/>
         </p:nvSpPr>
@@ -2303,7 +2204,7 @@
       </p:sp>
       <p:sp>
         <p:nvSpPr>
-          <p:cNvPr id="72" name="Line 34"/>
+          <p:cNvPr id="69" name="Line 34"/>
           <p:cNvSpPr/>
           <p:nvPr/>
         </p:nvSpPr>
@@ -2325,14 +2226,14 @@
       </p:sp>
       <p:sp>
         <p:nvSpPr>
-          <p:cNvPr id="73" name="CustomShape 35"/>
+          <p:cNvPr id="70" name="CustomShape 35"/>
           <p:cNvSpPr/>
           <p:nvPr/>
         </p:nvSpPr>
         <p:spPr>
           <a:xfrm rot="16630800">
-            <a:off x="2241720" y="4946040"/>
-            <a:ext cx="109080" cy="109080"/>
+            <a:off x="2241360" y="4946400"/>
+            <a:ext cx="108720" cy="108720"/>
           </a:xfrm>
           <a:prstGeom prst="ellipse">
             <a:avLst/>
@@ -2358,14 +2259,14 @@
       </p:sp>
       <p:sp>
         <p:nvSpPr>
-          <p:cNvPr id="74" name="CustomShape 36"/>
+          <p:cNvPr id="71" name="CustomShape 36"/>
           <p:cNvSpPr/>
           <p:nvPr/>
         </p:nvSpPr>
         <p:spPr>
           <a:xfrm rot="17449800">
-            <a:off x="1596600" y="4665240"/>
-            <a:ext cx="317160" cy="441000"/>
+            <a:off x="1596240" y="4665240"/>
+            <a:ext cx="316800" cy="440640"/>
           </a:xfrm>
           <a:prstGeom prst="rect">
             <a:avLst/>
@@ -2391,7 +2292,7 @@
       </p:sp>
       <p:sp>
         <p:nvSpPr>
-          <p:cNvPr id="75" name="Line 37"/>
+          <p:cNvPr id="72" name="Line 37"/>
           <p:cNvSpPr/>
           <p:nvPr/>
         </p:nvSpPr>
@@ -2413,14 +2314,14 @@
       </p:sp>
       <p:sp>
         <p:nvSpPr>
-          <p:cNvPr id="76" name="CustomShape 38"/>
+          <p:cNvPr id="73" name="CustomShape 38"/>
           <p:cNvSpPr/>
           <p:nvPr/>
         </p:nvSpPr>
         <p:spPr>
           <a:xfrm rot="16630800">
-            <a:off x="1254240" y="4475880"/>
-            <a:ext cx="109080" cy="109080"/>
+            <a:off x="1253880" y="4476240"/>
+            <a:ext cx="108720" cy="108720"/>
           </a:xfrm>
           <a:prstGeom prst="ellipse">
             <a:avLst/>
@@ -2446,14 +2347,14 @@
       </p:sp>
       <p:sp>
         <p:nvSpPr>
-          <p:cNvPr id="77" name="CustomShape 39"/>
+          <p:cNvPr id="74" name="CustomShape 39"/>
           <p:cNvSpPr/>
           <p:nvPr/>
         </p:nvSpPr>
         <p:spPr>
           <a:xfrm rot="20671800">
             <a:off x="769320" y="3917520"/>
-            <a:ext cx="317160" cy="441000"/>
+            <a:ext cx="316800" cy="440640"/>
           </a:xfrm>
           <a:prstGeom prst="rect">
             <a:avLst/>
@@ -2479,14 +2380,14 @@
       </p:sp>
       <p:sp>
         <p:nvSpPr>
-          <p:cNvPr id="78" name="CustomShape 40"/>
+          <p:cNvPr id="75" name="CustomShape 40"/>
           <p:cNvSpPr/>
           <p:nvPr/>
         </p:nvSpPr>
         <p:spPr>
           <a:xfrm rot="16630800">
-            <a:off x="864360" y="3457080"/>
-            <a:ext cx="109080" cy="109080"/>
+            <a:off x="864000" y="3457440"/>
+            <a:ext cx="108720" cy="108720"/>
           </a:xfrm>
           <a:prstGeom prst="ellipse">
             <a:avLst/>
@@ -2512,14 +2413,14 @@
       </p:sp>
       <p:sp>
         <p:nvSpPr>
-          <p:cNvPr id="79" name="CustomShape 41"/>
+          <p:cNvPr id="76" name="CustomShape 41"/>
           <p:cNvSpPr/>
           <p:nvPr/>
         </p:nvSpPr>
         <p:spPr>
           <a:xfrm rot="14565000">
-            <a:off x="1293840" y="2956680"/>
-            <a:ext cx="317160" cy="441000"/>
+            <a:off x="1293840" y="2957040"/>
+            <a:ext cx="316800" cy="440640"/>
           </a:xfrm>
           <a:prstGeom prst="rect">
             <a:avLst/>
@@ -2545,14 +2446,14 @@
       </p:sp>
       <p:sp>
         <p:nvSpPr>
-          <p:cNvPr id="80" name="CustomShape 42"/>
+          <p:cNvPr id="77" name="CustomShape 42"/>
           <p:cNvSpPr/>
           <p:nvPr/>
         </p:nvSpPr>
         <p:spPr>
           <a:xfrm>
             <a:off x="4901760" y="3211560"/>
-            <a:ext cx="109080" cy="109080"/>
+            <a:ext cx="108720" cy="108720"/>
           </a:xfrm>
           <a:prstGeom prst="ellipse">
             <a:avLst/>
@@ -2578,14 +2479,14 @@
       </p:sp>
       <p:sp>
         <p:nvSpPr>
-          <p:cNvPr id="81" name="CustomShape 43"/>
+          <p:cNvPr id="78" name="CustomShape 43"/>
           <p:cNvSpPr/>
           <p:nvPr/>
         </p:nvSpPr>
         <p:spPr>
           <a:xfrm rot="5400000">
-            <a:off x="5434920" y="3115800"/>
-            <a:ext cx="317160" cy="441000"/>
+            <a:off x="5435280" y="3115800"/>
+            <a:ext cx="316800" cy="440640"/>
           </a:xfrm>
           <a:prstGeom prst="rect">
             <a:avLst/>
@@ -2611,14 +2512,14 @@
       </p:sp>
       <p:sp>
         <p:nvSpPr>
-          <p:cNvPr id="82" name="CustomShape 44"/>
+          <p:cNvPr id="79" name="CustomShape 44"/>
           <p:cNvSpPr/>
           <p:nvPr/>
         </p:nvSpPr>
         <p:spPr>
           <a:xfrm>
             <a:off x="6187680" y="3164040"/>
-            <a:ext cx="109080" cy="109080"/>
+            <a:ext cx="108720" cy="108720"/>
           </a:xfrm>
           <a:prstGeom prst="ellipse">
             <a:avLst/>
@@ -2644,14 +2545,14 @@
       </p:sp>
       <p:sp>
         <p:nvSpPr>
-          <p:cNvPr id="83" name="CustomShape 45"/>
+          <p:cNvPr id="80" name="CustomShape 45"/>
           <p:cNvSpPr/>
           <p:nvPr/>
         </p:nvSpPr>
         <p:spPr>
           <a:xfrm rot="583800">
-            <a:off x="6167880" y="2429640"/>
-            <a:ext cx="317160" cy="441000"/>
+            <a:off x="6167880" y="2429280"/>
+            <a:ext cx="316800" cy="440640"/>
           </a:xfrm>
           <a:prstGeom prst="rect">
             <a:avLst/>
@@ -2677,14 +2578,14 @@
       </p:sp>
       <p:sp>
         <p:nvSpPr>
-          <p:cNvPr id="84" name="CustomShape 46"/>
+          <p:cNvPr id="81" name="CustomShape 46"/>
           <p:cNvSpPr/>
           <p:nvPr/>
         </p:nvSpPr>
         <p:spPr>
           <a:xfrm>
             <a:off x="3857400" y="2584800"/>
-            <a:ext cx="93600" cy="796680"/>
+            <a:ext cx="93240" cy="796320"/>
           </a:xfrm>
           <a:prstGeom prst="straightConnector1">
             <a:avLst/>
@@ -2701,14 +2602,14 @@
       </p:sp>
       <p:sp>
         <p:nvSpPr>
-          <p:cNvPr id="85" name="CustomShape 47"/>
+          <p:cNvPr id="82" name="CustomShape 47"/>
           <p:cNvSpPr/>
           <p:nvPr/>
         </p:nvSpPr>
         <p:spPr>
           <a:xfrm>
             <a:off x="2837520" y="2139480"/>
-            <a:ext cx="2320920" cy="638280"/>
+            <a:ext cx="2320560" cy="637920"/>
           </a:xfrm>
           <a:prstGeom prst="rect">
             <a:avLst/>
@@ -2733,7 +2634,7 @@
                 </a:solidFill>
                 <a:latin typeface="Calibri"/>
               </a:rPr>
-              <a:t>Change joint value</a:t>
+              <a:t>setPosition(q1)</a:t>
             </a:r>
             <a:endParaRPr/>
           </a:p>
@@ -2741,14 +2642,14 @@
       </p:sp>
       <p:sp>
         <p:nvSpPr>
-          <p:cNvPr id="86" name="CustomShape 48"/>
+          <p:cNvPr id="83" name="CustomShape 48"/>
           <p:cNvSpPr/>
           <p:nvPr/>
         </p:nvSpPr>
         <p:spPr>
           <a:xfrm flipV="1">
             <a:off x="2251080" y="5139720"/>
-            <a:ext cx="23040" cy="503640"/>
+            <a:ext cx="22680" cy="503280"/>
           </a:xfrm>
           <a:prstGeom prst="straightConnector1">
             <a:avLst/>
@@ -2765,14 +2666,14 @@
       </p:sp>
       <p:sp>
         <p:nvSpPr>
-          <p:cNvPr id="87" name="CustomShape 49"/>
+          <p:cNvPr id="84" name="CustomShape 49"/>
           <p:cNvSpPr/>
           <p:nvPr/>
         </p:nvSpPr>
         <p:spPr>
           <a:xfrm>
             <a:off x="1289880" y="5691600"/>
-            <a:ext cx="2016000" cy="638280"/>
+            <a:ext cx="2015640" cy="637920"/>
           </a:xfrm>
           <a:prstGeom prst="rect">
             <a:avLst/>
@@ -2797,7 +2698,7 @@
                 </a:solidFill>
                 <a:latin typeface="Calibri"/>
               </a:rPr>
-              <a:t>Change joint value</a:t>
+              <a:t>setPosition(q2)</a:t>
             </a:r>
             <a:endParaRPr/>
           </a:p>

</xml_diff>